<commit_message>
Text to Speech and web interface update
</commit_message>
<xml_diff>
--- a/paper work/SignLanguageTranslatorML.pptx
+++ b/paper work/SignLanguageTranslatorML.pptx
@@ -4675,7 +4675,7 @@
             <a:fld id="{4C19062C-9A95-497B-BE44-F02982D1651D}" type="datetimeFigureOut">
               <a:rPr lang="en-IN" smtClean="0"/>
               <a:pPr/>
-              <a:t>06-03-2019</a:t>
+              <a:t>29-03-2019</a:t>
             </a:fld>
             <a:endParaRPr lang="en-IN" dirty="0"/>
           </a:p>
@@ -12269,7 +12269,7 @@
         </p:nvSpPr>
         <p:spPr>
           <a:xfrm>
-            <a:off x="705394" y="1445616"/>
+            <a:off x="705394" y="1210483"/>
             <a:ext cx="7054850" cy="826770"/>
           </a:xfrm>
           <a:prstGeom prst="rect">

</xml_diff>